<commit_message>
preparing to rewrite the section on modulation
</commit_message>
<xml_diff>
--- a/MEPhI/TradAccConf17_Presentation.pptx
+++ b/MEPhI/TradAccConf17_Presentation.pptx
@@ -198,7 +198,8 @@
           <a:p>
             <a:fld id="{93BB564A-DFC0-44B8-9B7D-B933F2637A11}" type="datetimeFigureOut">
               <a:rPr lang="ru-RU" smtClean="0"/>
-              <a:t>19.01.2017</a:t>
+              <a:pPr/>
+              <a:t>20.01.2017</a:t>
             </a:fld>
             <a:endParaRPr lang="ru-RU"/>
           </a:p>
@@ -359,6 +360,7 @@
           <a:p>
             <a:fld id="{4EB9CB02-5650-452C-B0A2-0739D639671D}" type="slidenum">
               <a:rPr lang="ru-RU" smtClean="0"/>
+              <a:pPr/>
               <a:t>‹#›</a:t>
             </a:fld>
             <a:endParaRPr lang="ru-RU"/>
@@ -529,7 +531,15 @@
           <a:p>
             <a:r>
               <a:rPr lang="en-US" baseline="0" dirty="0" smtClean="0"/>
-              <a:t>We want the sample points as congregated around the nodes as possible, but a measurement takes a finite time to take, so we can fit only as much within a given time frame (counts/measurement), and while we wait for the next node, the measurements’ </a:t>
+              <a:t>We want the sample points as congregated around the nodes as possible, but a measurement takes a finite time to take, so we can fit only as much within a given time frame </a:t>
+            </a:r>
+            <a:r>
+              <a:rPr lang="en-US" baseline="0" dirty="0" smtClean="0"/>
+              <a:t>(unless we decrease the precision of a measurement; counts/measurement</a:t>
+            </a:r>
+            <a:r>
+              <a:rPr lang="en-US" baseline="0" dirty="0" smtClean="0"/>
+              <a:t>), and while we wait for the next node, the measurements’ </a:t>
             </a:r>
             <a:r>
               <a:rPr lang="en-US" baseline="0" dirty="0" err="1" smtClean="0"/>
@@ -570,6 +580,7 @@
           <a:p>
             <a:fld id="{4EB9CB02-5650-452C-B0A2-0739D639671D}" type="slidenum">
               <a:rPr lang="ru-RU" smtClean="0"/>
+              <a:pPr/>
               <a:t>4</a:t>
             </a:fld>
             <a:endParaRPr lang="ru-RU"/>
@@ -731,6 +742,7 @@
           <a:p>
             <a:fld id="{4EB9CB02-5650-452C-B0A2-0739D639671D}" type="slidenum">
               <a:rPr lang="ru-RU" smtClean="0"/>
+              <a:pPr/>
               <a:t>6</a:t>
             </a:fld>
             <a:endParaRPr lang="ru-RU"/>
@@ -786,7 +798,7 @@
           </a:ln>
           <a:extLst>
             <a:ext uri="{91240B29-F687-4F45-9708-019B960494DF}">
-              <a14:hiddenLine xmlns:a14="http://schemas.microsoft.com/office/drawing/2010/main" xmlns="" w="9525">
+              <a14:hiddenLine xmlns="" xmlns:a14="http://schemas.microsoft.com/office/drawing/2010/main" w="9525">
                 <a:solidFill>
                   <a:srgbClr val="000000"/>
                 </a:solidFill>
@@ -935,7 +947,7 @@
           </a:ln>
           <a:extLst>
             <a:ext uri="{91240B29-F687-4F45-9708-019B960494DF}">
-              <a14:hiddenLine xmlns:a14="http://schemas.microsoft.com/office/drawing/2010/main" xmlns="" w="9525">
+              <a14:hiddenLine xmlns="" xmlns:a14="http://schemas.microsoft.com/office/drawing/2010/main" w="9525">
                 <a:solidFill>
                   <a:srgbClr val="000000"/>
                 </a:solidFill>
@@ -1084,7 +1096,7 @@
           </a:ln>
           <a:extLst>
             <a:ext uri="{91240B29-F687-4F45-9708-019B960494DF}">
-              <a14:hiddenLine xmlns:a14="http://schemas.microsoft.com/office/drawing/2010/main" xmlns="" w="9525">
+              <a14:hiddenLine xmlns="" xmlns:a14="http://schemas.microsoft.com/office/drawing/2010/main" w="9525">
                 <a:solidFill>
                   <a:srgbClr val="000000"/>
                 </a:solidFill>
@@ -1230,7 +1242,7 @@
           </a:ln>
           <a:extLst>
             <a:ext uri="{91240B29-F687-4F45-9708-019B960494DF}">
-              <a14:hiddenLine xmlns:a14="http://schemas.microsoft.com/office/drawing/2010/main" xmlns="" w="9525">
+              <a14:hiddenLine xmlns="" xmlns:a14="http://schemas.microsoft.com/office/drawing/2010/main" w="9525">
                 <a:solidFill>
                   <a:srgbClr val="000000"/>
                 </a:solidFill>
@@ -1376,7 +1388,7 @@
           </a:ln>
           <a:extLst>
             <a:ext uri="{91240B29-F687-4F45-9708-019B960494DF}">
-              <a14:hiddenLine xmlns:a14="http://schemas.microsoft.com/office/drawing/2010/main" xmlns="" w="9525">
+              <a14:hiddenLine xmlns="" xmlns:a14="http://schemas.microsoft.com/office/drawing/2010/main" w="9525">
                 <a:solidFill>
                   <a:srgbClr val="000000"/>
                 </a:solidFill>
@@ -1525,7 +1537,7 @@
           </a:ln>
           <a:extLst>
             <a:ext uri="{91240B29-F687-4F45-9708-019B960494DF}">
-              <a14:hiddenLine xmlns:a14="http://schemas.microsoft.com/office/drawing/2010/main" xmlns="" w="9525">
+              <a14:hiddenLine xmlns="" xmlns:a14="http://schemas.microsoft.com/office/drawing/2010/main" w="9525">
                 <a:solidFill>
                   <a:srgbClr val="000000"/>
                 </a:solidFill>
@@ -1669,14 +1681,14 @@
           </a:ln>
           <a:extLst>
             <a:ext uri="{909E8E84-426E-40DD-AFC4-6F175D3DCCD1}">
-              <a14:hiddenFill xmlns:a14="http://schemas.microsoft.com/office/drawing/2010/main" xmlns="">
+              <a14:hiddenFill xmlns="" xmlns:a14="http://schemas.microsoft.com/office/drawing/2010/main">
                 <a:solidFill>
                   <a:srgbClr val="FFFFFF"/>
                 </a:solidFill>
               </a14:hiddenFill>
             </a:ext>
             <a:ext uri="{91240B29-F687-4F45-9708-019B960494DF}">
-              <a14:hiddenLine xmlns:a14="http://schemas.microsoft.com/office/drawing/2010/main" xmlns="" w="9525">
+              <a14:hiddenLine xmlns="" xmlns:a14="http://schemas.microsoft.com/office/drawing/2010/main" w="9525">
                 <a:solidFill>
                   <a:srgbClr val="000000"/>
                 </a:solidFill>
@@ -1810,7 +1822,7 @@
                 </a:spcBef>
                 <a:defRPr/>
               </a:pPr>
-              <a:t>19. Januar 2017</a:t>
+              <a:t>20. Januar 2017</a:t>
             </a:fld>
             <a:endParaRPr lang="de-DE" altLang="en-US" sz="1400" smtClean="0">
               <a:solidFill>
@@ -1844,14 +1856,14 @@
           </a:ln>
           <a:extLst>
             <a:ext uri="{909E8E84-426E-40DD-AFC4-6F175D3DCCD1}">
-              <a14:hiddenFill xmlns:a14="http://schemas.microsoft.com/office/drawing/2010/main" xmlns="">
+              <a14:hiddenFill xmlns="" xmlns:a14="http://schemas.microsoft.com/office/drawing/2010/main">
                 <a:solidFill>
                   <a:srgbClr val="FFFFFF"/>
                 </a:solidFill>
               </a14:hiddenFill>
             </a:ext>
             <a:ext uri="{91240B29-F687-4F45-9708-019B960494DF}">
-              <a14:hiddenLine xmlns:a14="http://schemas.microsoft.com/office/drawing/2010/main" xmlns="" w="9525">
+              <a14:hiddenLine xmlns="" xmlns:a14="http://schemas.microsoft.com/office/drawing/2010/main" w="9525">
                 <a:solidFill>
                   <a:srgbClr val="000000"/>
                 </a:solidFill>
@@ -5821,7 +5833,7 @@
           </a:ln>
           <a:extLst>
             <a:ext uri="{91240B29-F687-4F45-9708-019B960494DF}">
-              <a14:hiddenLine xmlns:a14="http://schemas.microsoft.com/office/drawing/2010/main" xmlns="" w="9525">
+              <a14:hiddenLine xmlns="" xmlns:a14="http://schemas.microsoft.com/office/drawing/2010/main" w="9525">
                 <a:solidFill>
                   <a:srgbClr val="000000"/>
                 </a:solidFill>
@@ -5967,7 +5979,7 @@
           </a:ln>
           <a:extLst>
             <a:ext uri="{91240B29-F687-4F45-9708-019B960494DF}">
-              <a14:hiddenLine xmlns:a14="http://schemas.microsoft.com/office/drawing/2010/main" xmlns="" w="9525">
+              <a14:hiddenLine xmlns="" xmlns:a14="http://schemas.microsoft.com/office/drawing/2010/main" w="9525">
                 <a:solidFill>
                   <a:srgbClr val="000000"/>
                 </a:solidFill>
@@ -6113,7 +6125,7 @@
           </a:ln>
           <a:extLst>
             <a:ext uri="{91240B29-F687-4F45-9708-019B960494DF}">
-              <a14:hiddenLine xmlns:a14="http://schemas.microsoft.com/office/drawing/2010/main" xmlns="" w="9525">
+              <a14:hiddenLine xmlns="" xmlns:a14="http://schemas.microsoft.com/office/drawing/2010/main" w="9525">
                 <a:solidFill>
                   <a:srgbClr val="000000"/>
                 </a:solidFill>
@@ -6259,7 +6271,7 @@
           </a:ln>
           <a:extLst>
             <a:ext uri="{91240B29-F687-4F45-9708-019B960494DF}">
-              <a14:hiddenLine xmlns:a14="http://schemas.microsoft.com/office/drawing/2010/main" xmlns="" w="9525">
+              <a14:hiddenLine xmlns="" xmlns:a14="http://schemas.microsoft.com/office/drawing/2010/main" w="9525">
                 <a:solidFill>
                   <a:srgbClr val="000000"/>
                 </a:solidFill>
@@ -6408,7 +6420,7 @@
           </a:ln>
           <a:extLst>
             <a:ext uri="{91240B29-F687-4F45-9708-019B960494DF}">
-              <a14:hiddenLine xmlns:a14="http://schemas.microsoft.com/office/drawing/2010/main" xmlns="" w="9525">
+              <a14:hiddenLine xmlns="" xmlns:a14="http://schemas.microsoft.com/office/drawing/2010/main" w="9525">
                 <a:solidFill>
                   <a:srgbClr val="000000"/>
                 </a:solidFill>
@@ -6552,14 +6564,14 @@
           </a:ln>
           <a:extLst>
             <a:ext uri="{909E8E84-426E-40DD-AFC4-6F175D3DCCD1}">
-              <a14:hiddenFill xmlns:a14="http://schemas.microsoft.com/office/drawing/2010/main" xmlns="">
+              <a14:hiddenFill xmlns="" xmlns:a14="http://schemas.microsoft.com/office/drawing/2010/main">
                 <a:solidFill>
                   <a:srgbClr val="FFFFFF"/>
                 </a:solidFill>
               </a14:hiddenFill>
             </a:ext>
             <a:ext uri="{91240B29-F687-4F45-9708-019B960494DF}">
-              <a14:hiddenLine xmlns:a14="http://schemas.microsoft.com/office/drawing/2010/main" xmlns="" w="9525">
+              <a14:hiddenLine xmlns="" xmlns:a14="http://schemas.microsoft.com/office/drawing/2010/main" w="9525">
                 <a:solidFill>
                   <a:srgbClr val="000000"/>
                 </a:solidFill>
@@ -6686,7 +6698,7 @@
               <a:pPr eaLnBrk="1" hangingPunct="1">
                 <a:defRPr/>
               </a:pPr>
-              <a:t>19. Januar 2017</a:t>
+              <a:t>20. Januar 2017</a:t>
             </a:fld>
             <a:endParaRPr lang="de-DE" altLang="en-US" sz="1000" smtClean="0">
               <a:solidFill>
@@ -6719,14 +6731,14 @@
           </a:ln>
           <a:extLst>
             <a:ext uri="{909E8E84-426E-40DD-AFC4-6F175D3DCCD1}">
-              <a14:hiddenFill xmlns:a14="http://schemas.microsoft.com/office/drawing/2010/main" xmlns="">
+              <a14:hiddenFill xmlns="" xmlns:a14="http://schemas.microsoft.com/office/drawing/2010/main">
                 <a:solidFill>
                   <a:srgbClr val="FFFFFF"/>
                 </a:solidFill>
               </a14:hiddenFill>
             </a:ext>
             <a:ext uri="{91240B29-F687-4F45-9708-019B960494DF}">
-              <a14:hiddenLine xmlns:a14="http://schemas.microsoft.com/office/drawing/2010/main" xmlns="" w="9525">
+              <a14:hiddenLine xmlns="" xmlns:a14="http://schemas.microsoft.com/office/drawing/2010/main" w="9525">
                 <a:solidFill>
                   <a:srgbClr val="000000"/>
                 </a:solidFill>
@@ -8596,12 +8608,12 @@
           <p:nvPr/>
         </p:nvGraphicFramePr>
         <p:xfrm>
-          <a:off x="4427984" y="2564904"/>
-          <a:ext cx="2381605" cy="1020688"/>
+          <a:off x="4016375" y="2452688"/>
+          <a:ext cx="3205163" cy="1247775"/>
         </p:xfrm>
         <a:graphic>
           <a:graphicData uri="http://schemas.openxmlformats.org/presentationml/2006/ole">
-            <p:oleObj spid="_x0000_s2051" name="Equation" r:id="rId4" imgW="1066680" imgH="457200" progId="Equation.3">
+            <p:oleObj spid="_x0000_s2051" name="Equation" r:id="rId4" imgW="1434960" imgH="558720" progId="Equation.3">
               <p:embed/>
             </p:oleObj>
           </a:graphicData>
@@ -8623,50 +8635,14 @@
         </p:blipFill>
         <p:spPr>
           <a:xfrm>
-            <a:off x="2483768" y="3645024"/>
-            <a:ext cx="4926210" cy="3017303"/>
+            <a:off x="2567389" y="3645024"/>
+            <a:ext cx="4758966" cy="3017303"/>
           </a:xfrm>
           <a:prstGeom prst="rect">
             <a:avLst/>
           </a:prstGeom>
         </p:spPr>
       </p:pic>
-      <p:sp>
-        <p:nvSpPr>
-          <p:cNvPr id="9" name="TextBox 8"/>
-          <p:cNvSpPr txBox="1"/>
-          <p:nvPr/>
-        </p:nvSpPr>
-        <p:spPr>
-          <a:xfrm>
-            <a:off x="3059832" y="3645024"/>
-            <a:ext cx="325730" cy="369332"/>
-          </a:xfrm>
-          <a:prstGeom prst="rect">
-            <a:avLst/>
-          </a:prstGeom>
-          <a:noFill/>
-        </p:spPr>
-        <p:txBody>
-          <a:bodyPr wrap="none" rtlCol="0">
-            <a:spAutoFit/>
-          </a:bodyPr>
-          <a:lstStyle/>
-          <a:p>
-            <a:r>
-              <a:rPr lang="en-US" i="1" dirty="0" smtClean="0">
-                <a:latin typeface="Times New Roman" pitchFamily="18" charset="0"/>
-                <a:cs typeface="Times New Roman" pitchFamily="18" charset="0"/>
-              </a:rPr>
-              <a:t>F</a:t>
-            </a:r>
-            <a:endParaRPr lang="ru-RU" i="1" dirty="0">
-              <a:latin typeface="Times New Roman" pitchFamily="18" charset="0"/>
-              <a:cs typeface="Times New Roman" pitchFamily="18" charset="0"/>
-            </a:endParaRPr>
-          </a:p>
-        </p:txBody>
-      </p:sp>
     </p:spTree>
   </p:cSld>
   <p:clrMapOvr>

</xml_diff>

<commit_message>
Presentation; spread info, stat table
</commit_message>
<xml_diff>
--- a/MEPhI/TradAccConf17_Presentation.pptx
+++ b/MEPhI/TradAccConf17_Presentation.pptx
@@ -199,7 +199,7 @@
             <a:fld id="{93BB564A-DFC0-44B8-9B7D-B933F2637A11}" type="datetimeFigureOut">
               <a:rPr lang="ru-RU" smtClean="0"/>
               <a:pPr/>
-              <a:t>20.01.2017</a:t>
+              <a:t>22.01.2017</a:t>
             </a:fld>
             <a:endParaRPr lang="ru-RU"/>
           </a:p>
@@ -531,15 +531,7 @@
           <a:p>
             <a:r>
               <a:rPr lang="en-US" baseline="0" dirty="0" smtClean="0"/>
-              <a:t>We want the sample points as congregated around the nodes as possible, but a measurement takes a finite time to take, so we can fit only as much within a given time frame </a:t>
-            </a:r>
-            <a:r>
-              <a:rPr lang="en-US" baseline="0" dirty="0" smtClean="0"/>
-              <a:t>(unless we decrease the precision of a measurement; counts/measurement</a:t>
-            </a:r>
-            <a:r>
-              <a:rPr lang="en-US" baseline="0" dirty="0" smtClean="0"/>
-              <a:t>), and while we wait for the next node, the measurements’ </a:t>
+              <a:t>We want the sample points as congregated around the nodes as possible, but a measurement takes a finite time to take, so we can fit only as much within a given time frame (unless we decrease the precision of a measurement; counts/measurement), and while we wait for the next node, the measurements’ </a:t>
             </a:r>
             <a:r>
               <a:rPr lang="en-US" baseline="0" dirty="0" err="1" smtClean="0"/>
@@ -1822,7 +1814,7 @@
                 </a:spcBef>
                 <a:defRPr/>
               </a:pPr>
-              <a:t>20. Januar 2017</a:t>
+              <a:t>22. Januar 2017</a:t>
             </a:fld>
             <a:endParaRPr lang="de-DE" altLang="en-US" sz="1400" smtClean="0">
               <a:solidFill>
@@ -6698,7 +6690,7 @@
               <a:pPr eaLnBrk="1" hangingPunct="1">
                 <a:defRPr/>
               </a:pPr>
-              <a:t>20. Januar 2017</a:t>
+              <a:t>22. Januar 2017</a:t>
             </a:fld>
             <a:endParaRPr lang="de-DE" altLang="en-US" sz="1000" smtClean="0">
               <a:solidFill>
@@ -7965,6 +7957,13 @@
   <p:clrMapOvr>
     <a:masterClrMapping/>
   </p:clrMapOvr>
+  <p:timing>
+    <p:tnLst>
+      <p:par>
+        <p:cTn id="1" dur="indefinite" restart="never" nodeType="tmRoot"/>
+      </p:par>
+    </p:tnLst>
+  </p:timing>
 </p:sld>
 </file>
 
@@ -8002,7 +8001,7 @@
           <a:p>
             <a:r>
               <a:rPr lang="en-US" dirty="0" smtClean="0"/>
-              <a:t>Measurement methodology</a:t>
+              <a:t>Foundation</a:t>
             </a:r>
             <a:endParaRPr lang="ru-RU" dirty="0"/>
           </a:p>
@@ -8470,6 +8469,13 @@
   <p:clrMapOvr>
     <a:masterClrMapping/>
   </p:clrMapOvr>
+  <p:timing>
+    <p:tnLst>
+      <p:par>
+        <p:cTn id="1" dur="indefinite" restart="never" nodeType="tmRoot"/>
+      </p:par>
+    </p:tnLst>
+  </p:timing>
 </p:sld>
 </file>
 
@@ -8608,7 +8614,7 @@
           <p:nvPr/>
         </p:nvGraphicFramePr>
         <p:xfrm>
-          <a:off x="4016375" y="2452688"/>
+          <a:off x="4067944" y="2564904"/>
           <a:ext cx="3205163" cy="1247775"/>
         </p:xfrm>
         <a:graphic>
@@ -8648,6 +8654,13 @@
   <p:clrMapOvr>
     <a:masterClrMapping/>
   </p:clrMapOvr>
+  <p:timing>
+    <p:tnLst>
+      <p:par>
+        <p:cTn id="1" dur="indefinite" restart="never" nodeType="tmRoot"/>
+      </p:par>
+    </p:tnLst>
+  </p:timing>
 </p:sld>
 </file>
 
@@ -8691,14 +8704,37 @@
           </a:p>
         </p:txBody>
       </p:sp>
+      <p:pic>
+        <p:nvPicPr>
+          <p:cNvPr id="9" name="Content Placeholder 8" descr="FallingInfo.png"/>
+          <p:cNvPicPr>
+            <a:picLocks noGrp="1" noChangeAspect="1"/>
+          </p:cNvPicPr>
+          <p:nvPr>
+            <p:ph idx="1"/>
+          </p:nvPr>
+        </p:nvPicPr>
+        <p:blipFill>
+          <a:blip r:embed="rId4" cstate="print"/>
+          <a:stretch>
+            <a:fillRect/>
+          </a:stretch>
+        </p:blipFill>
+        <p:spPr>
+          <a:xfrm>
+            <a:off x="3595645" y="1306877"/>
+            <a:ext cx="5070558" cy="3785458"/>
+          </a:xfrm>
+        </p:spPr>
+      </p:pic>
       <p:sp>
         <p:nvSpPr>
-          <p:cNvPr id="3" name="Content Placeholder 2"/>
+          <p:cNvPr id="8" name="Text Placeholder 7"/>
           <p:cNvSpPr>
             <a:spLocks noGrp="1"/>
           </p:cNvSpPr>
           <p:nvPr>
-            <p:ph idx="1"/>
+            <p:ph type="body" sz="half" idx="2"/>
           </p:nvPr>
         </p:nvSpPr>
         <p:spPr/>
@@ -8711,15 +8747,15 @@
               <a:buChar char="•"/>
             </a:pPr>
             <a:r>
-              <a:rPr lang="en-US" dirty="0" smtClean="0"/>
+              <a:rPr lang="en-US" sz="2000" dirty="0" smtClean="0"/>
               <a:t> We want the sample as </a:t>
             </a:r>
             <a:r>
-              <a:rPr lang="en-US" b="1" dirty="0" smtClean="0"/>
+              <a:rPr lang="en-US" sz="2000" b="1" dirty="0" smtClean="0"/>
               <a:t>spread</a:t>
             </a:r>
             <a:r>
-              <a:rPr lang="en-US" dirty="0" smtClean="0"/>
+              <a:rPr lang="en-US" sz="2000" dirty="0" smtClean="0"/>
               <a:t> out in time, as possible </a:t>
             </a:r>
           </a:p>
@@ -8729,14 +8765,14 @@
               <a:buChar char="•"/>
             </a:pPr>
             <a:r>
-              <a:rPr lang="en-US" dirty="0" smtClean="0"/>
-              <a:t>Spin tune </a:t>
-            </a:r>
-            <a:r>
-              <a:rPr lang="en-US" b="1" dirty="0" err="1" smtClean="0"/>
+              <a:rPr lang="en-US" sz="2000" dirty="0" smtClean="0"/>
+              <a:t> Spin tune </a:t>
+            </a:r>
+            <a:r>
+              <a:rPr lang="en-US" sz="2000" b="1" dirty="0" err="1" smtClean="0"/>
               <a:t>decoherence</a:t>
             </a:r>
-            <a:endParaRPr lang="en-US" b="1" dirty="0" smtClean="0"/>
+            <a:endParaRPr lang="en-US" sz="2000" b="1" dirty="0" smtClean="0"/>
           </a:p>
           <a:p>
             <a:pPr>
@@ -8744,15 +8780,15 @@
               <a:buChar char="•"/>
             </a:pPr>
             <a:r>
-              <a:rPr lang="en-US" dirty="0" smtClean="0"/>
-              <a:t>We want the measurements </a:t>
-            </a:r>
-            <a:r>
-              <a:rPr lang="en-US" b="1" dirty="0" smtClean="0"/>
+              <a:rPr lang="en-US" sz="2000" dirty="0" smtClean="0"/>
+              <a:t> We want the measurements </a:t>
+            </a:r>
+            <a:r>
+              <a:rPr lang="en-US" sz="2000" b="1" dirty="0" smtClean="0"/>
               <a:t>congregated</a:t>
             </a:r>
             <a:r>
-              <a:rPr lang="en-US" dirty="0" smtClean="0"/>
+              <a:rPr lang="en-US" sz="2000" dirty="0" smtClean="0"/>
               <a:t> around the nodes</a:t>
             </a:r>
           </a:p>
@@ -8762,15 +8798,19 @@
               <a:buChar char="•"/>
             </a:pPr>
             <a:r>
-              <a:rPr lang="en-US" dirty="0" err="1" smtClean="0"/>
+              <a:rPr lang="en-US" sz="2000" dirty="0" smtClean="0"/>
+              <a:t> </a:t>
+            </a:r>
+            <a:r>
+              <a:rPr lang="en-US" sz="2000" dirty="0" err="1" smtClean="0"/>
               <a:t>Polarimetry</a:t>
             </a:r>
             <a:r>
-              <a:rPr lang="en-US" dirty="0" smtClean="0"/>
+              <a:rPr lang="en-US" sz="2000" dirty="0" smtClean="0"/>
               <a:t> </a:t>
             </a:r>
             <a:r>
-              <a:rPr lang="en-US" b="1" dirty="0" smtClean="0"/>
+              <a:rPr lang="en-US" sz="2000" b="1" dirty="0" smtClean="0"/>
               <a:t>counts per measurement</a:t>
             </a:r>
           </a:p>
@@ -8780,20 +8820,16 @@
               <a:buChar char="•"/>
             </a:pPr>
             <a:r>
-              <a:rPr lang="en-US" dirty="0" smtClean="0"/>
-              <a:t>Spin tune </a:t>
-            </a:r>
-            <a:r>
-              <a:rPr lang="en-US" dirty="0" err="1" smtClean="0"/>
+              <a:rPr lang="en-US" sz="2000" dirty="0" smtClean="0"/>
+              <a:t> Spin tune </a:t>
+            </a:r>
+            <a:r>
+              <a:rPr lang="en-US" sz="2000" dirty="0" err="1" smtClean="0"/>
               <a:t>decoherence</a:t>
             </a:r>
-            <a:endParaRPr lang="en-US" dirty="0" smtClean="0"/>
-          </a:p>
-          <a:p>
-            <a:pPr>
-              <a:buFont typeface="Arial" pitchFamily="34" charset="0"/>
-              <a:buChar char="•"/>
-            </a:pPr>
+            <a:endParaRPr lang="en-US" sz="2000" dirty="0" smtClean="0"/>
+          </a:p>
+          <a:p>
             <a:endParaRPr lang="ru-RU" dirty="0"/>
           </a:p>
         </p:txBody>
@@ -8807,12 +8843,12 @@
           <p:nvPr/>
         </p:nvGraphicFramePr>
         <p:xfrm>
-          <a:off x="4427984" y="2204864"/>
+          <a:off x="2555776" y="2564904"/>
           <a:ext cx="424938" cy="546348"/>
         </p:xfrm>
         <a:graphic>
           <a:graphicData uri="http://schemas.openxmlformats.org/presentationml/2006/ole">
-            <p:oleObj spid="_x0000_s3074" name="Equation" r:id="rId4" imgW="177480" imgH="228600" progId="Equation.3">
+            <p:oleObj spid="_x0000_s3074" name="Equation" r:id="rId5" imgW="177480" imgH="228600" progId="Equation.3">
               <p:embed/>
             </p:oleObj>
           </a:graphicData>
@@ -8823,6 +8859,13 @@
   <p:clrMapOvr>
     <a:masterClrMapping/>
   </p:clrMapOvr>
+  <p:timing>
+    <p:tnLst>
+      <p:par>
+        <p:cTn id="1" dur="indefinite" restart="never" nodeType="tmRoot"/>
+      </p:par>
+    </p:tnLst>
+  </p:timing>
 </p:sld>
 </file>
 
@@ -8866,30 +8909,442 @@
           </a:p>
         </p:txBody>
       </p:sp>
+      <p:pic>
+        <p:nvPicPr>
+          <p:cNvPr id="10" name="Content Placeholder 9" descr="XtotOnTime.png"/>
+          <p:cNvPicPr>
+            <a:picLocks noGrp="1" noChangeAspect="1"/>
+          </p:cNvPicPr>
+          <p:nvPr>
+            <p:ph sz="half" idx="2"/>
+          </p:nvPr>
+        </p:nvPicPr>
+        <p:blipFill>
+          <a:blip r:embed="rId3" cstate="print"/>
+          <a:stretch>
+            <a:fillRect/>
+          </a:stretch>
+        </p:blipFill>
+        <p:spPr>
+          <a:xfrm>
+            <a:off x="4212752" y="1916832"/>
+            <a:ext cx="4607719" cy="3970619"/>
+          </a:xfrm>
+        </p:spPr>
+      </p:pic>
+      <p:graphicFrame>
+        <p:nvGraphicFramePr>
+          <p:cNvPr id="6" name="Content Placeholder 5"/>
+          <p:cNvGraphicFramePr>
+            <a:graphicFrameLocks noChangeAspect="1"/>
+          </p:cNvGraphicFramePr>
+          <p:nvPr>
+            <p:ph sz="half" idx="1"/>
+          </p:nvPr>
+        </p:nvGraphicFramePr>
+        <p:xfrm>
+          <a:off x="574675" y="1844675"/>
+          <a:ext cx="3740150" cy="798513"/>
+        </p:xfrm>
+        <a:graphic>
+          <a:graphicData uri="http://schemas.openxmlformats.org/presentationml/2006/ole">
+            <p:oleObj spid="_x0000_s32770" name="Equation" r:id="rId4" imgW="2260440" imgH="482400" progId="Equation.3">
+              <p:embed/>
+            </p:oleObj>
+          </a:graphicData>
+        </a:graphic>
+      </p:graphicFrame>
       <p:sp>
         <p:nvSpPr>
-          <p:cNvPr id="3" name="Content Placeholder 2"/>
-          <p:cNvSpPr>
-            <a:spLocks noGrp="1"/>
-          </p:cNvSpPr>
-          <p:nvPr>
-            <p:ph idx="1"/>
-          </p:nvPr>
+          <p:cNvPr id="7" name="Oval 6"/>
+          <p:cNvSpPr/>
+          <p:nvPr/>
         </p:nvSpPr>
-        <p:spPr/>
+        <p:spPr>
+          <a:xfrm>
+            <a:off x="2555776" y="1556792"/>
+            <a:ext cx="1872208" cy="1296144"/>
+          </a:xfrm>
+          <a:prstGeom prst="ellipse">
+            <a:avLst/>
+          </a:prstGeom>
+          <a:solidFill>
+            <a:schemeClr val="accent1">
+              <a:alpha val="17000"/>
+            </a:schemeClr>
+          </a:solidFill>
+        </p:spPr>
+        <p:style>
+          <a:lnRef idx="2">
+            <a:schemeClr val="accent1">
+              <a:shade val="50000"/>
+            </a:schemeClr>
+          </a:lnRef>
+          <a:fillRef idx="1">
+            <a:schemeClr val="accent1"/>
+          </a:fillRef>
+          <a:effectRef idx="0">
+            <a:schemeClr val="accent1"/>
+          </a:effectRef>
+          <a:fontRef idx="minor">
+            <a:schemeClr val="lt1"/>
+          </a:fontRef>
+        </p:style>
         <p:txBody>
-          <a:bodyPr/>
+          <a:bodyPr rtlCol="0" anchor="ctr"/>
           <a:lstStyle/>
           <a:p>
+            <a:pPr algn="ctr"/>
             <a:endParaRPr lang="ru-RU"/>
           </a:p>
         </p:txBody>
       </p:sp>
+      <p:graphicFrame>
+        <p:nvGraphicFramePr>
+          <p:cNvPr id="34" name="Table 33"/>
+          <p:cNvGraphicFramePr>
+            <a:graphicFrameLocks noGrp="1"/>
+          </p:cNvGraphicFramePr>
+          <p:nvPr/>
+        </p:nvGraphicFramePr>
+        <p:xfrm>
+          <a:off x="467544" y="4149080"/>
+          <a:ext cx="3600399" cy="2520278"/>
+        </p:xfrm>
+        <a:graphic>
+          <a:graphicData uri="http://schemas.openxmlformats.org/drawingml/2006/table">
+            <a:tbl>
+              <a:tblPr firstRow="1" bandRow="1">
+                <a:tableStyleId>{5C22544A-7EE6-4342-B048-85BDC9FD1C3A}</a:tableStyleId>
+              </a:tblPr>
+              <a:tblGrid>
+                <a:gridCol w="1200133"/>
+                <a:gridCol w="1200133"/>
+                <a:gridCol w="1200133"/>
+              </a:tblGrid>
+              <a:tr h="969338">
+                <a:tc>
+                  <a:txBody>
+                    <a:bodyPr/>
+                    <a:lstStyle/>
+                    <a:p>
+                      <a:r>
+                        <a:rPr lang="en-US" dirty="0" smtClean="0"/>
+                        <a:t>FI limit</a:t>
+                      </a:r>
+                      <a:r>
+                        <a:rPr lang="en-US" baseline="0" dirty="0" smtClean="0"/>
+                        <a:t> (%)</a:t>
+                      </a:r>
+                      <a:endParaRPr lang="ru-RU" dirty="0"/>
+                    </a:p>
+                  </a:txBody>
+                  <a:tcPr/>
+                </a:tc>
+                <a:tc>
+                  <a:txBody>
+                    <a:bodyPr/>
+                    <a:lstStyle/>
+                    <a:p>
+                      <a:r>
+                        <a:rPr lang="en-US" dirty="0" smtClean="0"/>
+                        <a:t>Reached</a:t>
+                      </a:r>
+                      <a:r>
+                        <a:rPr lang="en-US" baseline="0" dirty="0" smtClean="0"/>
+                        <a:t> (×</a:t>
+                      </a:r>
+                      <a:r>
+                        <a:rPr lang="el-GR" baseline="0" dirty="0" smtClean="0"/>
+                        <a:t>τ</a:t>
+                      </a:r>
+                      <a:r>
+                        <a:rPr lang="en-US" baseline="-25000" dirty="0" smtClean="0"/>
+                        <a:t>d</a:t>
+                      </a:r>
+                      <a:r>
+                        <a:rPr lang="en-US" baseline="0" dirty="0" smtClean="0"/>
+                        <a:t>)</a:t>
+                      </a:r>
+                      <a:endParaRPr lang="ru-RU" dirty="0"/>
+                    </a:p>
+                  </a:txBody>
+                  <a:tcPr/>
+                </a:tc>
+                <a:tc>
+                  <a:txBody>
+                    <a:bodyPr/>
+                    <a:lstStyle/>
+                    <a:p>
+                      <a:r>
+                        <a:rPr lang="en-US" dirty="0" smtClean="0"/>
+                        <a:t>SNR @3% error</a:t>
+                      </a:r>
+                      <a:endParaRPr lang="ru-RU" dirty="0"/>
+                    </a:p>
+                  </a:txBody>
+                  <a:tcPr/>
+                </a:tc>
+              </a:tr>
+              <a:tr h="387735">
+                <a:tc>
+                  <a:txBody>
+                    <a:bodyPr/>
+                    <a:lstStyle/>
+                    <a:p>
+                      <a:pPr algn="r"/>
+                      <a:r>
+                        <a:rPr lang="en-US" dirty="0" smtClean="0"/>
+                        <a:t>95</a:t>
+                      </a:r>
+                      <a:endParaRPr lang="ru-RU" dirty="0"/>
+                    </a:p>
+                  </a:txBody>
+                  <a:tcPr/>
+                </a:tc>
+                <a:tc>
+                  <a:txBody>
+                    <a:bodyPr/>
+                    <a:lstStyle/>
+                    <a:p>
+                      <a:pPr algn="r"/>
+                      <a:r>
+                        <a:rPr lang="en-US" dirty="0" smtClean="0"/>
+                        <a:t>3.0</a:t>
+                      </a:r>
+                      <a:endParaRPr lang="ru-RU" dirty="0"/>
+                    </a:p>
+                  </a:txBody>
+                  <a:tcPr/>
+                </a:tc>
+                <a:tc>
+                  <a:txBody>
+                    <a:bodyPr/>
+                    <a:lstStyle/>
+                    <a:p>
+                      <a:pPr algn="r"/>
+                      <a:r>
+                        <a:rPr lang="en-US" dirty="0" smtClean="0"/>
+                        <a:t>1.7</a:t>
+                      </a:r>
+                      <a:endParaRPr lang="ru-RU" dirty="0"/>
+                    </a:p>
+                  </a:txBody>
+                  <a:tcPr/>
+                </a:tc>
+              </a:tr>
+              <a:tr h="387735">
+                <a:tc>
+                  <a:txBody>
+                    <a:bodyPr/>
+                    <a:lstStyle/>
+                    <a:p>
+                      <a:pPr algn="r"/>
+                      <a:r>
+                        <a:rPr lang="en-US" dirty="0" smtClean="0"/>
+                        <a:t>90</a:t>
+                      </a:r>
+                      <a:endParaRPr lang="ru-RU" dirty="0"/>
+                    </a:p>
+                  </a:txBody>
+                  <a:tcPr/>
+                </a:tc>
+                <a:tc>
+                  <a:txBody>
+                    <a:bodyPr/>
+                    <a:lstStyle/>
+                    <a:p>
+                      <a:pPr algn="r"/>
+                      <a:r>
+                        <a:rPr lang="en-US" dirty="0" smtClean="0"/>
+                        <a:t>2.3</a:t>
+                      </a:r>
+                      <a:endParaRPr lang="ru-RU" dirty="0"/>
+                    </a:p>
+                  </a:txBody>
+                  <a:tcPr/>
+                </a:tc>
+                <a:tc>
+                  <a:txBody>
+                    <a:bodyPr/>
+                    <a:lstStyle/>
+                    <a:p>
+                      <a:pPr algn="r"/>
+                      <a:r>
+                        <a:rPr lang="en-US" dirty="0" smtClean="0"/>
+                        <a:t>3.3</a:t>
+                      </a:r>
+                      <a:endParaRPr lang="ru-RU" dirty="0"/>
+                    </a:p>
+                  </a:txBody>
+                  <a:tcPr/>
+                </a:tc>
+              </a:tr>
+              <a:tr h="387735">
+                <a:tc>
+                  <a:txBody>
+                    <a:bodyPr/>
+                    <a:lstStyle/>
+                    <a:p>
+                      <a:pPr algn="r"/>
+                      <a:r>
+                        <a:rPr lang="en-US" dirty="0" smtClean="0"/>
+                        <a:t>70</a:t>
+                      </a:r>
+                      <a:endParaRPr lang="ru-RU" dirty="0"/>
+                    </a:p>
+                  </a:txBody>
+                  <a:tcPr/>
+                </a:tc>
+                <a:tc>
+                  <a:txBody>
+                    <a:bodyPr/>
+                    <a:lstStyle/>
+                    <a:p>
+                      <a:pPr algn="r"/>
+                      <a:r>
+                        <a:rPr lang="en-US" dirty="0" smtClean="0"/>
+                        <a:t>1.2</a:t>
+                      </a:r>
+                      <a:endParaRPr lang="ru-RU" dirty="0"/>
+                    </a:p>
+                  </a:txBody>
+                  <a:tcPr/>
+                </a:tc>
+                <a:tc>
+                  <a:txBody>
+                    <a:bodyPr/>
+                    <a:lstStyle/>
+                    <a:p>
+                      <a:pPr algn="r"/>
+                      <a:r>
+                        <a:rPr lang="en-US" dirty="0" smtClean="0"/>
+                        <a:t>10.0</a:t>
+                      </a:r>
+                      <a:endParaRPr lang="ru-RU" dirty="0"/>
+                    </a:p>
+                  </a:txBody>
+                  <a:tcPr/>
+                </a:tc>
+              </a:tr>
+              <a:tr h="387735">
+                <a:tc>
+                  <a:txBody>
+                    <a:bodyPr/>
+                    <a:lstStyle/>
+                    <a:p>
+                      <a:pPr algn="r"/>
+                      <a:r>
+                        <a:rPr lang="en-US" dirty="0" smtClean="0"/>
+                        <a:t>50</a:t>
+                      </a:r>
+                      <a:endParaRPr lang="ru-RU" dirty="0"/>
+                    </a:p>
+                  </a:txBody>
+                  <a:tcPr/>
+                </a:tc>
+                <a:tc>
+                  <a:txBody>
+                    <a:bodyPr/>
+                    <a:lstStyle/>
+                    <a:p>
+                      <a:pPr algn="r"/>
+                      <a:r>
+                        <a:rPr lang="en-US" dirty="0" smtClean="0"/>
+                        <a:t>0.7</a:t>
+                      </a:r>
+                      <a:endParaRPr lang="ru-RU" dirty="0"/>
+                    </a:p>
+                  </a:txBody>
+                  <a:tcPr/>
+                </a:tc>
+                <a:tc>
+                  <a:txBody>
+                    <a:bodyPr/>
+                    <a:lstStyle/>
+                    <a:p>
+                      <a:pPr algn="r"/>
+                      <a:r>
+                        <a:rPr lang="en-US" dirty="0" smtClean="0"/>
+                        <a:t>16.5</a:t>
+                      </a:r>
+                      <a:endParaRPr lang="ru-RU" dirty="0"/>
+                    </a:p>
+                  </a:txBody>
+                  <a:tcPr/>
+                </a:tc>
+              </a:tr>
+            </a:tbl>
+          </a:graphicData>
+        </a:graphic>
+      </p:graphicFrame>
+      <p:graphicFrame>
+        <p:nvGraphicFramePr>
+          <p:cNvPr id="36" name="Object 35"/>
+          <p:cNvGraphicFramePr>
+            <a:graphicFrameLocks noChangeAspect="1"/>
+          </p:cNvGraphicFramePr>
+          <p:nvPr/>
+        </p:nvGraphicFramePr>
+        <p:xfrm>
+          <a:off x="611560" y="3429000"/>
+          <a:ext cx="2616178" cy="588640"/>
+        </p:xfrm>
+        <a:graphic>
+          <a:graphicData uri="http://schemas.openxmlformats.org/presentationml/2006/ole">
+            <p:oleObj spid="_x0000_s32774" name="Equation" r:id="rId5" imgW="1015920" imgH="228600" progId="Equation.3">
+              <p:embed/>
+            </p:oleObj>
+          </a:graphicData>
+        </a:graphic>
+      </p:graphicFrame>
+      <p:cxnSp>
+        <p:nvCxnSpPr>
+          <p:cNvPr id="16" name="Curved Connector 15"/>
+          <p:cNvCxnSpPr>
+            <a:stCxn id="7" idx="4"/>
+          </p:cNvCxnSpPr>
+          <p:nvPr/>
+        </p:nvCxnSpPr>
+        <p:spPr>
+          <a:xfrm rot="16200000" flipH="1">
+            <a:off x="3563888" y="2780928"/>
+            <a:ext cx="792088" cy="936104"/>
+          </a:xfrm>
+          <a:prstGeom prst="curvedConnector2">
+            <a:avLst/>
+          </a:prstGeom>
+          <a:ln>
+            <a:tailEnd type="arrow"/>
+          </a:ln>
+        </p:spPr>
+        <p:style>
+          <a:lnRef idx="3">
+            <a:schemeClr val="accent1"/>
+          </a:lnRef>
+          <a:fillRef idx="0">
+            <a:schemeClr val="accent1"/>
+          </a:fillRef>
+          <a:effectRef idx="2">
+            <a:schemeClr val="accent1"/>
+          </a:effectRef>
+          <a:fontRef idx="minor">
+            <a:schemeClr val="tx1"/>
+          </a:fontRef>
+        </p:style>
+      </p:cxnSp>
     </p:spTree>
   </p:cSld>
   <p:clrMapOvr>
     <a:masterClrMapping/>
   </p:clrMapOvr>
+  <p:timing>
+    <p:tnLst>
+      <p:par>
+        <p:cTn id="1" dur="indefinite" restart="never" nodeType="tmRoot"/>
+      </p:par>
+    </p:tnLst>
+  </p:timing>
 </p:sld>
 </file>
 
@@ -8957,6 +9412,13 @@
   <p:clrMapOvr>
     <a:masterClrMapping/>
   </p:clrMapOvr>
+  <p:timing>
+    <p:tnLst>
+      <p:par>
+        <p:cTn id="1" dur="indefinite" restart="never" nodeType="tmRoot"/>
+      </p:par>
+    </p:tnLst>
+  </p:timing>
 </p:sld>
 </file>
 

</xml_diff>

<commit_message>
modulation section added; a section on achievable precision remains
</commit_message>
<xml_diff>
--- a/MEPhI/TradAccConf17_Presentation.pptx
+++ b/MEPhI/TradAccConf17_Presentation.pptx
@@ -199,7 +199,7 @@
             <a:fld id="{93BB564A-DFC0-44B8-9B7D-B933F2637A11}" type="datetimeFigureOut">
               <a:rPr lang="ru-RU" smtClean="0"/>
               <a:pPr/>
-              <a:t>22.01.2017</a:t>
+              <a:t>23.01.2017</a:t>
             </a:fld>
             <a:endParaRPr lang="ru-RU"/>
           </a:p>
@@ -707,11 +707,7 @@
             </a:r>
             <a:r>
               <a:rPr lang="en-US" baseline="0" dirty="0" smtClean="0"/>
-              <a:t> the </a:t>
-            </a:r>
-            <a:r>
-              <a:rPr lang="en-US" baseline="0" smtClean="0"/>
-              <a:t>duty cycle</a:t>
+              <a:t> the duty cycle</a:t>
             </a:r>
             <a:endParaRPr lang="ru-RU" dirty="0"/>
           </a:p>
@@ -1814,7 +1810,7 @@
                 </a:spcBef>
                 <a:defRPr/>
               </a:pPr>
-              <a:t>22. Januar 2017</a:t>
+              <a:t>23. Januar 2017</a:t>
             </a:fld>
             <a:endParaRPr lang="de-DE" altLang="en-US" sz="1400" smtClean="0">
               <a:solidFill>
@@ -6690,7 +6686,7 @@
               <a:pPr eaLnBrk="1" hangingPunct="1">
                 <a:defRPr/>
               </a:pPr>
-              <a:t>22. Januar 2017</a:t>
+              <a:t>23. Januar 2017</a:t>
             </a:fld>
             <a:endParaRPr lang="de-DE" altLang="en-US" sz="1000" smtClean="0">
               <a:solidFill>
@@ -9388,14 +9384,37 @@
           </a:p>
         </p:txBody>
       </p:sp>
+      <p:pic>
+        <p:nvPicPr>
+          <p:cNvPr id="6" name="Content Placeholder 5" descr="CMPTOnSEwPart.png"/>
+          <p:cNvPicPr>
+            <a:picLocks noGrp="1" noChangeAspect="1"/>
+          </p:cNvPicPr>
+          <p:nvPr>
+            <p:ph idx="1"/>
+          </p:nvPr>
+        </p:nvPicPr>
+        <p:blipFill>
+          <a:blip r:embed="rId4" cstate="print"/>
+          <a:stretch>
+            <a:fillRect/>
+          </a:stretch>
+        </p:blipFill>
+        <p:spPr>
+          <a:xfrm>
+            <a:off x="3575050" y="757834"/>
+            <a:ext cx="5389438" cy="4644251"/>
+          </a:xfrm>
+        </p:spPr>
+      </p:pic>
       <p:sp>
         <p:nvSpPr>
-          <p:cNvPr id="3" name="Content Placeholder 2"/>
+          <p:cNvPr id="7" name="Text Placeholder 6"/>
           <p:cNvSpPr>
             <a:spLocks noGrp="1"/>
           </p:cNvSpPr>
           <p:nvPr>
-            <p:ph idx="1"/>
+            <p:ph type="body" sz="half" idx="2"/>
           </p:nvPr>
         </p:nvSpPr>
         <p:spPr/>
@@ -9403,10 +9422,91 @@
           <a:bodyPr/>
           <a:lstStyle/>
           <a:p>
-            <a:endParaRPr lang="ru-RU"/>
+            <a:endParaRPr lang="en-US" dirty="0" smtClean="0"/>
+          </a:p>
+          <a:p>
+            <a:endParaRPr lang="en-US" dirty="0" smtClean="0"/>
+          </a:p>
+          <a:p>
+            <a:endParaRPr lang="en-US" dirty="0" smtClean="0"/>
+          </a:p>
+          <a:p>
+            <a:endParaRPr lang="en-US" dirty="0" smtClean="0"/>
+          </a:p>
+          <a:p>
+            <a:endParaRPr lang="en-US" dirty="0" smtClean="0"/>
+          </a:p>
+          <a:p>
+            <a:endParaRPr lang="en-US" dirty="0" smtClean="0"/>
+          </a:p>
+          <a:p>
+            <a:endParaRPr lang="en-US" dirty="0" smtClean="0"/>
+          </a:p>
+          <a:p>
+            <a:endParaRPr lang="en-US" dirty="0" smtClean="0"/>
           </a:p>
         </p:txBody>
       </p:sp>
+      <p:graphicFrame>
+        <p:nvGraphicFramePr>
+          <p:cNvPr id="8" name="Object 7"/>
+          <p:cNvGraphicFramePr>
+            <a:graphicFrameLocks noChangeAspect="1"/>
+          </p:cNvGraphicFramePr>
+          <p:nvPr/>
+        </p:nvGraphicFramePr>
+        <p:xfrm>
+          <a:off x="4114800" y="3321050"/>
+          <a:ext cx="914400" cy="215900"/>
+        </p:xfrm>
+        <a:graphic>
+          <a:graphicData uri="http://schemas.openxmlformats.org/presentationml/2006/ole">
+            <p:oleObj spid="_x0000_s34818" name="Equation" r:id="rId5" imgW="914400" imgH="215640" progId="Equation.3">
+              <p:embed/>
+            </p:oleObj>
+          </a:graphicData>
+        </a:graphic>
+      </p:graphicFrame>
+      <p:graphicFrame>
+        <p:nvGraphicFramePr>
+          <p:cNvPr id="9" name="Object 8"/>
+          <p:cNvGraphicFramePr>
+            <a:graphicFrameLocks noChangeAspect="1"/>
+          </p:cNvGraphicFramePr>
+          <p:nvPr/>
+        </p:nvGraphicFramePr>
+        <p:xfrm>
+          <a:off x="323528" y="1556792"/>
+          <a:ext cx="3384376" cy="3382401"/>
+        </p:xfrm>
+        <a:graphic>
+          <a:graphicData uri="http://schemas.openxmlformats.org/presentationml/2006/ole">
+            <p:oleObj spid="_x0000_s34819" name="Equation" r:id="rId6" imgW="1498320" imgH="1498320" progId="Equation.3">
+              <p:embed/>
+            </p:oleObj>
+          </a:graphicData>
+        </a:graphic>
+      </p:graphicFrame>
+      <p:graphicFrame>
+        <p:nvGraphicFramePr>
+          <p:cNvPr id="11" name="Object 10"/>
+          <p:cNvGraphicFramePr>
+            <a:graphicFrameLocks noChangeAspect="1"/>
+          </p:cNvGraphicFramePr>
+          <p:nvPr/>
+        </p:nvGraphicFramePr>
+        <p:xfrm>
+          <a:off x="395535" y="5445224"/>
+          <a:ext cx="5918593" cy="936104"/>
+        </p:xfrm>
+        <a:graphic>
+          <a:graphicData uri="http://schemas.openxmlformats.org/presentationml/2006/ole">
+            <p:oleObj spid="_x0000_s34820" name="Equation" r:id="rId7" imgW="2489040" imgH="393480" progId="Equation.3">
+              <p:embed/>
+            </p:oleObj>
+          </a:graphicData>
+        </a:graphic>
+      </p:graphicFrame>
     </p:spTree>
   </p:cSld>
   <p:clrMapOvr>

</xml_diff>

<commit_message>
last picture in TradAccConf presentation
</commit_message>
<xml_diff>
--- a/MEPhI/TradAccConf17_Presentation.pptx
+++ b/MEPhI/TradAccConf17_Presentation.pptx
@@ -6,7 +6,7 @@
     <p:sldMasterId id="2147483674" r:id="rId2"/>
   </p:sldMasterIdLst>
   <p:notesMasterIdLst>
-    <p:notesMasterId r:id="rId9"/>
+    <p:notesMasterId r:id="rId10"/>
   </p:notesMasterIdLst>
   <p:sldIdLst>
     <p:sldId id="256" r:id="rId3"/>
@@ -15,6 +15,7 @@
     <p:sldId id="259" r:id="rId6"/>
     <p:sldId id="260" r:id="rId7"/>
     <p:sldId id="261" r:id="rId8"/>
+    <p:sldId id="262" r:id="rId9"/>
   </p:sldIdLst>
   <p:sldSz cx="9144000" cy="6858000" type="screen4x3"/>
   <p:notesSz cx="6858000" cy="9144000"/>
@@ -199,7 +200,7 @@
             <a:fld id="{93BB564A-DFC0-44B8-9B7D-B933F2637A11}" type="datetimeFigureOut">
               <a:rPr lang="ru-RU" smtClean="0"/>
               <a:pPr/>
-              <a:t>23.01.2017</a:t>
+              <a:t>24.01.2017</a:t>
             </a:fld>
             <a:endParaRPr lang="ru-RU"/>
           </a:p>
@@ -551,6 +552,17 @@
             </a:r>
           </a:p>
           <a:p>
+            <a:r>
+              <a:rPr lang="en-US" b="1" baseline="0" dirty="0" smtClean="0"/>
+              <a:t>However</a:t>
+            </a:r>
+            <a:r>
+              <a:rPr lang="en-US" baseline="0" dirty="0" smtClean="0"/>
+              <a:t>, if we increase the number of pellets while reducing measurement time, we can balance the decrease in the number of counts per measurement caused by the reduction of the time with the increase due to the greater scattering rate.</a:t>
+            </a:r>
+            <a:endParaRPr lang="en-US" baseline="0" dirty="0" smtClean="0"/>
+          </a:p>
+          <a:p>
             <a:endParaRPr lang="ru-RU" dirty="0"/>
           </a:p>
         </p:txBody>
@@ -634,80 +646,15 @@
           <a:lstStyle/>
           <a:p>
             <a:pPr marL="228600" indent="-228600">
-              <a:buAutoNum type="arabicParenR"/>
+              <a:buNone/>
             </a:pPr>
             <a:r>
               <a:rPr lang="en-US" dirty="0" smtClean="0"/>
-              <a:t>From</a:t>
+              <a:t>The precision gain due to the increase in the spread is limited. After we’ve established the</a:t>
             </a:r>
             <a:r>
               <a:rPr lang="en-US" baseline="0" dirty="0" smtClean="0"/>
-              <a:t> Spread, compute the number of nodes</a:t>
-            </a:r>
-          </a:p>
-          <a:p>
-            <a:pPr marL="228600" indent="-228600">
-              <a:buAutoNum type="arabicParenR"/>
-            </a:pPr>
-            <a:r>
-              <a:rPr lang="en-US" baseline="0" dirty="0" smtClean="0"/>
-              <a:t>Measurement error as a function of the number of counts/measurement</a:t>
-            </a:r>
-          </a:p>
-          <a:p>
-            <a:pPr marL="228600" indent="-228600">
-              <a:buAutoNum type="arabicParenR"/>
-            </a:pPr>
-            <a:r>
-              <a:rPr lang="en-US" baseline="0" dirty="0" smtClean="0"/>
-              <a:t>From required standard error, Spread, and measurement error compute F</a:t>
-            </a:r>
-          </a:p>
-          <a:p>
-            <a:pPr marL="228600" indent="-228600">
-              <a:buAutoNum type="arabicParenR"/>
-            </a:pPr>
-            <a:r>
-              <a:rPr lang="en-US" baseline="0" dirty="0" smtClean="0"/>
-              <a:t>Express F via the number of nodes, measurements/node; F = n(</a:t>
-            </a:r>
-            <a:r>
-              <a:rPr lang="en-US" baseline="0" dirty="0" err="1" smtClean="0"/>
-              <a:t>meas</a:t>
-            </a:r>
-            <a:r>
-              <a:rPr lang="en-US" baseline="0" dirty="0" smtClean="0"/>
-              <a:t>/node) * fraction * x01; x01 is the mean value of fisher info in the 1</a:t>
-            </a:r>
-            <a:r>
-              <a:rPr lang="en-US" baseline="30000" dirty="0" smtClean="0"/>
-              <a:t>st</a:t>
-            </a:r>
-            <a:r>
-              <a:rPr lang="en-US" baseline="0" dirty="0" smtClean="0"/>
-              <a:t> region, hence determined by the </a:t>
-            </a:r>
-            <a:r>
-              <a:rPr lang="en-US" b="1" baseline="0" dirty="0" smtClean="0"/>
-              <a:t>compaction factor</a:t>
-            </a:r>
-            <a:r>
-              <a:rPr lang="en-US" b="0" baseline="0" dirty="0" smtClean="0"/>
-              <a:t>. x01 = tau/2 + sin (w*tau)/(2*w), tau = measurement pulse uptime</a:t>
-            </a:r>
-            <a:endParaRPr lang="en-US" baseline="0" dirty="0" smtClean="0"/>
-          </a:p>
-          <a:p>
-            <a:pPr marL="228600" indent="-228600">
-              <a:buAutoNum type="arabicParenR"/>
-            </a:pPr>
-            <a:r>
-              <a:rPr lang="en-US" dirty="0" smtClean="0"/>
-              <a:t>Equate the latter two, can now compute tau; can compute</a:t>
-            </a:r>
-            <a:r>
-              <a:rPr lang="en-US" baseline="0" dirty="0" smtClean="0"/>
-              <a:t> the duty cycle</a:t>
+              <a:t> optimal experiment duration, we can then balance compaction time, number of pellets with the required duration.</a:t>
             </a:r>
             <a:endParaRPr lang="ru-RU" dirty="0"/>
           </a:p>
@@ -732,6 +679,98 @@
               <a:rPr lang="ru-RU" smtClean="0"/>
               <a:pPr/>
               <a:t>6</a:t>
+            </a:fld>
+            <a:endParaRPr lang="ru-RU"/>
+          </a:p>
+        </p:txBody>
+      </p:sp>
+    </p:spTree>
+  </p:cSld>
+  <p:clrMapOvr>
+    <a:masterClrMapping/>
+  </p:clrMapOvr>
+</p:notes>
+</file>
+
+<file path=ppt/notesSlides/notesSlide3.xml><?xml version="1.0" encoding="utf-8"?>
+<p:notes xmlns:a="http://schemas.openxmlformats.org/drawingml/2006/main" xmlns:r="http://schemas.openxmlformats.org/officeDocument/2006/relationships" xmlns:p="http://schemas.openxmlformats.org/presentationml/2006/main">
+  <p:cSld>
+    <p:spTree>
+      <p:nvGrpSpPr>
+        <p:cNvPr id="1" name=""/>
+        <p:cNvGrpSpPr/>
+        <p:nvPr/>
+      </p:nvGrpSpPr>
+      <p:grpSpPr>
+        <a:xfrm>
+          <a:off x="0" y="0"/>
+          <a:ext cx="0" cy="0"/>
+          <a:chOff x="0" y="0"/>
+          <a:chExt cx="0" cy="0"/>
+        </a:xfrm>
+      </p:grpSpPr>
+      <p:sp>
+        <p:nvSpPr>
+          <p:cNvPr id="2" name="Slide Image Placeholder 1"/>
+          <p:cNvSpPr>
+            <a:spLocks noGrp="1" noRot="1" noChangeAspect="1"/>
+          </p:cNvSpPr>
+          <p:nvPr>
+            <p:ph type="sldImg"/>
+          </p:nvPr>
+        </p:nvSpPr>
+        <p:spPr/>
+      </p:sp>
+      <p:sp>
+        <p:nvSpPr>
+          <p:cNvPr id="3" name="Notes Placeholder 2"/>
+          <p:cNvSpPr>
+            <a:spLocks noGrp="1"/>
+          </p:cNvSpPr>
+          <p:nvPr>
+            <p:ph type="body" idx="1"/>
+          </p:nvPr>
+        </p:nvSpPr>
+        <p:spPr/>
+        <p:txBody>
+          <a:bodyPr>
+            <a:normAutofit/>
+          </a:bodyPr>
+          <a:lstStyle/>
+          <a:p>
+            <a:r>
+              <a:rPr lang="en-US" dirty="0" smtClean="0"/>
+              <a:t>Guessed modulation frequency 3*(1+-1e-4)</a:t>
+            </a:r>
+          </a:p>
+          <a:p>
+            <a:r>
+              <a:rPr lang="en-US" dirty="0" smtClean="0"/>
+              <a:t>Measurement error 3% everywhere</a:t>
+            </a:r>
+            <a:endParaRPr lang="ru-RU" dirty="0"/>
+          </a:p>
+        </p:txBody>
+      </p:sp>
+      <p:sp>
+        <p:nvSpPr>
+          <p:cNvPr id="4" name="Slide Number Placeholder 3"/>
+          <p:cNvSpPr>
+            <a:spLocks noGrp="1"/>
+          </p:cNvSpPr>
+          <p:nvPr>
+            <p:ph type="sldNum" sz="quarter" idx="10"/>
+          </p:nvPr>
+        </p:nvSpPr>
+        <p:spPr/>
+        <p:txBody>
+          <a:bodyPr/>
+          <a:lstStyle/>
+          <a:p>
+            <a:fld id="{4EB9CB02-5650-452C-B0A2-0739D639671D}" type="slidenum">
+              <a:rPr lang="ru-RU" smtClean="0"/>
+              <a:pPr/>
+              <a:t>7</a:t>
             </a:fld>
             <a:endParaRPr lang="ru-RU"/>
           </a:p>
@@ -1810,7 +1849,7 @@
                 </a:spcBef>
                 <a:defRPr/>
               </a:pPr>
-              <a:t>23. Januar 2017</a:t>
+              <a:t>24. Januar 2017</a:t>
             </a:fld>
             <a:endParaRPr lang="de-DE" altLang="en-US" sz="1400" smtClean="0">
               <a:solidFill>
@@ -6686,7 +6725,7 @@
               <a:pPr eaLnBrk="1" hangingPunct="1">
                 <a:defRPr/>
               </a:pPr>
-              <a:t>23. Januar 2017</a:t>
+              <a:t>24. Januar 2017</a:t>
             </a:fld>
             <a:endParaRPr lang="de-DE" altLang="en-US" sz="1000" smtClean="0">
               <a:solidFill>
@@ -9004,8 +9043,8 @@
           <p:nvPr/>
         </p:nvGraphicFramePr>
         <p:xfrm>
-          <a:off x="467544" y="4149080"/>
-          <a:ext cx="3600399" cy="2520278"/>
+          <a:off x="467545" y="4149080"/>
+          <a:ext cx="3384375" cy="2520278"/>
         </p:xfrm>
         <a:graphic>
           <a:graphicData uri="http://schemas.openxmlformats.org/drawingml/2006/table">
@@ -9014,9 +9053,9 @@
                 <a:tableStyleId>{5C22544A-7EE6-4342-B048-85BDC9FD1C3A}</a:tableStyleId>
               </a:tblPr>
               <a:tblGrid>
-                <a:gridCol w="1200133"/>
-                <a:gridCol w="1200133"/>
-                <a:gridCol w="1200133"/>
+                <a:gridCol w="1008111"/>
+                <a:gridCol w="1152128"/>
+                <a:gridCol w="1224136"/>
               </a:tblGrid>
               <a:tr h="969338">
                 <a:tc>
@@ -9074,7 +9113,11 @@
                     <a:p>
                       <a:r>
                         <a:rPr lang="en-US" dirty="0" smtClean="0"/>
-                        <a:t>SNR @3% error</a:t>
+                        <a:t>SNR@3</a:t>
+                      </a:r>
+                      <a:r>
+                        <a:rPr lang="en-US" dirty="0" smtClean="0"/>
+                        <a:t>% error</a:t>
                       </a:r>
                       <a:endParaRPr lang="ru-RU" dirty="0"/>
                     </a:p>
@@ -9507,6 +9550,84 @@
           </a:graphicData>
         </a:graphic>
       </p:graphicFrame>
+    </p:spTree>
+  </p:cSld>
+  <p:clrMapOvr>
+    <a:masterClrMapping/>
+  </p:clrMapOvr>
+  <p:timing>
+    <p:tnLst>
+      <p:par>
+        <p:cTn id="1" dur="indefinite" restart="never" nodeType="tmRoot"/>
+      </p:par>
+    </p:tnLst>
+  </p:timing>
+</p:sld>
+</file>
+
+<file path=ppt/slides/slide7.xml><?xml version="1.0" encoding="utf-8"?>
+<p:sld xmlns:a="http://schemas.openxmlformats.org/drawingml/2006/main" xmlns:r="http://schemas.openxmlformats.org/officeDocument/2006/relationships" xmlns:p="http://schemas.openxmlformats.org/presentationml/2006/main">
+  <p:cSld>
+    <p:spTree>
+      <p:nvGrpSpPr>
+        <p:cNvPr id="1" name=""/>
+        <p:cNvGrpSpPr/>
+        <p:nvPr/>
+      </p:nvGrpSpPr>
+      <p:grpSpPr>
+        <a:xfrm>
+          <a:off x="0" y="0"/>
+          <a:ext cx="0" cy="0"/>
+          <a:chOff x="0" y="0"/>
+          <a:chExt cx="0" cy="0"/>
+        </a:xfrm>
+      </p:grpSpPr>
+      <p:sp>
+        <p:nvSpPr>
+          <p:cNvPr id="2" name="Title 1"/>
+          <p:cNvSpPr>
+            <a:spLocks noGrp="1"/>
+          </p:cNvSpPr>
+          <p:nvPr>
+            <p:ph type="title"/>
+          </p:nvPr>
+        </p:nvSpPr>
+        <p:spPr/>
+        <p:txBody>
+          <a:bodyPr/>
+          <a:lstStyle/>
+          <a:p>
+            <a:r>
+              <a:rPr lang="en-US" dirty="0" smtClean="0"/>
+              <a:t>Statistical precision</a:t>
+            </a:r>
+            <a:endParaRPr lang="ru-RU" dirty="0"/>
+          </a:p>
+        </p:txBody>
+      </p:sp>
+      <p:pic>
+        <p:nvPicPr>
+          <p:cNvPr id="4" name="Content Placeholder 3" descr="SEwOnCMPTMT.png"/>
+          <p:cNvPicPr>
+            <a:picLocks noGrp="1" noChangeAspect="1"/>
+          </p:cNvPicPr>
+          <p:nvPr>
+            <p:ph idx="1"/>
+          </p:nvPr>
+        </p:nvPicPr>
+        <p:blipFill>
+          <a:blip r:embed="rId3" cstate="print"/>
+          <a:stretch>
+            <a:fillRect/>
+          </a:stretch>
+        </p:blipFill>
+        <p:spPr>
+          <a:xfrm>
+            <a:off x="1646616" y="1412775"/>
+            <a:ext cx="6237750" cy="5375269"/>
+          </a:xfrm>
+        </p:spPr>
+      </p:pic>
     </p:spTree>
   </p:cSld>
   <p:clrMapOvr>

</xml_diff>